<commit_message>
[#10687] Re-organize test code to follow the same package structure as production code (#10690)
* Restructure test folder

* Fix ArchUnit configuration

* Fix architecture violations

* Reduce access modifier when possible

* Update design diagrams
</commit_message>
<xml_diff>
--- a/docs/images/ClientComponent.pptx
+++ b/docs/images/ClientComponent.pptx
@@ -209,7 +209,7 @@
             <a:fld id="{AF301891-4E62-472A-98E9-95DBD40531A4}" type="datetimeFigureOut">
               <a:rPr lang="en-SG" smtClean="0"/>
               <a:pPr/>
-              <a:t>28/9/2018</a:t>
+              <a:t>17/9/2020</a:t>
             </a:fld>
             <a:endParaRPr lang="en-SG"/>
           </a:p>
@@ -764,7 +764,7 @@
             <a:fld id="{1D8BD707-D9CF-40AE-B4C6-C98DA3205C09}" type="datetimeFigureOut">
               <a:rPr lang="en-US" smtClean="0"/>
               <a:pPr/>
-              <a:t>9/28/2018</a:t>
+              <a:t>9/17/2020</a:t>
             </a:fld>
             <a:endParaRPr lang="en-US"/>
           </a:p>
@@ -978,7 +978,7 @@
             <a:fld id="{1D8BD707-D9CF-40AE-B4C6-C98DA3205C09}" type="datetimeFigureOut">
               <a:rPr lang="en-US" smtClean="0"/>
               <a:pPr/>
-              <a:t>9/28/2018</a:t>
+              <a:t>9/17/2020</a:t>
             </a:fld>
             <a:endParaRPr lang="en-US"/>
           </a:p>
@@ -1185,7 +1185,7 @@
             <a:fld id="{1D8BD707-D9CF-40AE-B4C6-C98DA3205C09}" type="datetimeFigureOut">
               <a:rPr lang="en-US" smtClean="0"/>
               <a:pPr/>
-              <a:t>9/28/2018</a:t>
+              <a:t>9/17/2020</a:t>
             </a:fld>
             <a:endParaRPr lang="en-US"/>
           </a:p>
@@ -1392,7 +1392,7 @@
             <a:fld id="{1D8BD707-D9CF-40AE-B4C6-C98DA3205C09}" type="datetimeFigureOut">
               <a:rPr lang="en-US" smtClean="0"/>
               <a:pPr/>
-              <a:t>9/28/2018</a:t>
+              <a:t>9/17/2020</a:t>
             </a:fld>
             <a:endParaRPr lang="en-US"/>
           </a:p>
@@ -1665,7 +1665,7 @@
             <a:fld id="{1D8BD707-D9CF-40AE-B4C6-C98DA3205C09}" type="datetimeFigureOut">
               <a:rPr lang="en-US" smtClean="0"/>
               <a:pPr/>
-              <a:t>9/28/2018</a:t>
+              <a:t>9/17/2020</a:t>
             </a:fld>
             <a:endParaRPr lang="en-US"/>
           </a:p>
@@ -1988,7 +1988,7 @@
             <a:fld id="{1D8BD707-D9CF-40AE-B4C6-C98DA3205C09}" type="datetimeFigureOut">
               <a:rPr lang="en-US" smtClean="0"/>
               <a:pPr/>
-              <a:t>9/28/2018</a:t>
+              <a:t>9/17/2020</a:t>
             </a:fld>
             <a:endParaRPr lang="en-US"/>
           </a:p>
@@ -2451,7 +2451,7 @@
             <a:fld id="{1D8BD707-D9CF-40AE-B4C6-C98DA3205C09}" type="datetimeFigureOut">
               <a:rPr lang="en-US" smtClean="0"/>
               <a:pPr/>
-              <a:t>9/28/2018</a:t>
+              <a:t>9/17/2020</a:t>
             </a:fld>
             <a:endParaRPr lang="en-US"/>
           </a:p>
@@ -2598,7 +2598,7 @@
             <a:fld id="{1D8BD707-D9CF-40AE-B4C6-C98DA3205C09}" type="datetimeFigureOut">
               <a:rPr lang="en-US" smtClean="0"/>
               <a:pPr/>
-              <a:t>9/28/2018</a:t>
+              <a:t>9/17/2020</a:t>
             </a:fld>
             <a:endParaRPr lang="en-US"/>
           </a:p>
@@ -2714,7 +2714,7 @@
             <a:fld id="{1D8BD707-D9CF-40AE-B4C6-C98DA3205C09}" type="datetimeFigureOut">
               <a:rPr lang="en-US" smtClean="0"/>
               <a:pPr/>
-              <a:t>9/28/2018</a:t>
+              <a:t>9/17/2020</a:t>
             </a:fld>
             <a:endParaRPr lang="en-US"/>
           </a:p>
@@ -3021,7 +3021,7 @@
             <a:fld id="{1D8BD707-D9CF-40AE-B4C6-C98DA3205C09}" type="datetimeFigureOut">
               <a:rPr lang="en-US" smtClean="0"/>
               <a:pPr/>
-              <a:t>9/28/2018</a:t>
+              <a:t>9/17/2020</a:t>
             </a:fld>
             <a:endParaRPr lang="en-US"/>
           </a:p>
@@ -3304,7 +3304,7 @@
             <a:fld id="{1D8BD707-D9CF-40AE-B4C6-C98DA3205C09}" type="datetimeFigureOut">
               <a:rPr lang="en-US" smtClean="0"/>
               <a:pPr/>
-              <a:t>9/28/2018</a:t>
+              <a:t>9/17/2020</a:t>
             </a:fld>
             <a:endParaRPr lang="en-US"/>
           </a:p>
@@ -4275,7 +4275,7 @@
         <p:spPr>
           <a:xfrm flipH="1" flipV="1">
             <a:off x="2699684" y="2913165"/>
-            <a:ext cx="1039672" cy="1"/>
+            <a:ext cx="963472" cy="1"/>
           </a:xfrm>
           <a:prstGeom prst="straightConnector1">
             <a:avLst/>
@@ -4314,8 +4314,8 @@
         </p:nvSpPr>
         <p:spPr>
           <a:xfrm>
-            <a:off x="3739356" y="2638425"/>
-            <a:ext cx="1035506" cy="549481"/>
+            <a:off x="3663156" y="2638425"/>
+            <a:ext cx="1219200" cy="549481"/>
           </a:xfrm>
           <a:prstGeom prst="rect">
             <a:avLst/>
@@ -4419,7 +4419,7 @@
                   <a:schemeClr val="tx1"/>
                 </a:solidFill>
               </a:rPr>
-              <a:t>GAE </a:t>
+              <a:t>Google Cloud </a:t>
             </a:r>
             <a:r>
               <a:rPr lang="en-US" dirty="0" err="1" smtClean="0">

</xml_diff>